<commit_message>
adaugat unit testing in prezentare
</commit_message>
<xml_diff>
--- a/Documents/Application.Architecture.pptx
+++ b/Documents/Application.Architecture.pptx
@@ -5,10 +5,10 @@
     <p:sldMasterId id="2147483648" r:id="rId1"/>
   </p:sldMasterIdLst>
   <p:notesMasterIdLst>
-    <p:notesMasterId r:id="rId24"/>
+    <p:notesMasterId r:id="rId26"/>
   </p:notesMasterIdLst>
   <p:handoutMasterIdLst>
-    <p:handoutMasterId r:id="rId25"/>
+    <p:handoutMasterId r:id="rId27"/>
   </p:handoutMasterIdLst>
   <p:sldIdLst>
     <p:sldId id="266" r:id="rId2"/>
@@ -30,9 +30,11 @@
     <p:sldId id="322" r:id="rId18"/>
     <p:sldId id="326" r:id="rId19"/>
     <p:sldId id="323" r:id="rId20"/>
-    <p:sldId id="324" r:id="rId21"/>
-    <p:sldId id="325" r:id="rId22"/>
-    <p:sldId id="307" r:id="rId23"/>
+    <p:sldId id="327" r:id="rId21"/>
+    <p:sldId id="324" r:id="rId22"/>
+    <p:sldId id="325" r:id="rId23"/>
+    <p:sldId id="328" r:id="rId24"/>
+    <p:sldId id="307" r:id="rId25"/>
   </p:sldIdLst>
   <p:sldSz cx="9906000" cy="6858000" type="A4"/>
   <p:notesSz cx="7010400" cy="9296400"/>
@@ -2205,7 +2207,7 @@
                   <a:spcPct val="0"/>
                 </a:spcBef>
               </a:pPr>
-              <a:t>22</a:t>
+              <a:t>24</a:t>
             </a:fld>
             <a:endParaRPr lang="en-GB" altLang="en-US" dirty="0"/>
           </a:p>
@@ -10838,7 +10840,7 @@
         <p:spPr bwMode="auto">
           <a:xfrm>
             <a:off x="1189063" y="1201658"/>
-            <a:ext cx="7526982" cy="4401205"/>
+            <a:ext cx="7526982" cy="5016758"/>
           </a:xfrm>
           <a:prstGeom prst="rect">
             <a:avLst/>
@@ -11131,10 +11133,39 @@
               <a:defRPr/>
             </a:pPr>
             <a:r>
+              <a:rPr lang="en-US" altLang="en-US" sz="2000" dirty="0" err="1">
+                <a:cs typeface="Times New Roman" panose="02020603050405020304" pitchFamily="18" charset="0"/>
+              </a:rPr>
+              <a:t>Newtonsoft.JSON</a:t>
+            </a:r>
+            <a:r>
               <a:rPr lang="en-US" altLang="en-US" sz="2000" dirty="0">
                 <a:cs typeface="Times New Roman" panose="02020603050405020304" pitchFamily="18" charset="0"/>
               </a:rPr>
-              <a:t>Newtonsoft.JSON 10.0.3</a:t>
+              <a:t> 10.0.3</a:t>
+            </a:r>
+          </a:p>
+          <a:p>
+            <a:pPr>
+              <a:buFont typeface="Wingdings" panose="05000000000000000000" pitchFamily="2" charset="2"/>
+              <a:buChar char="Ø"/>
+              <a:defRPr/>
+            </a:pPr>
+            <a:endParaRPr lang="en-US" altLang="en-US" sz="2000" dirty="0">
+              <a:cs typeface="Times New Roman" panose="02020603050405020304" pitchFamily="18" charset="0"/>
+            </a:endParaRPr>
+          </a:p>
+          <a:p>
+            <a:pPr>
+              <a:buFont typeface="Wingdings" panose="05000000000000000000" pitchFamily="2" charset="2"/>
+              <a:buChar char="Ø"/>
+              <a:defRPr/>
+            </a:pPr>
+            <a:r>
+              <a:rPr lang="en-US" altLang="en-US" sz="2000" dirty="0">
+                <a:cs typeface="Times New Roman" panose="02020603050405020304" pitchFamily="18" charset="0"/>
+              </a:rPr>
+              <a:t>Unit Testing</a:t>
             </a:r>
           </a:p>
           <a:p>
@@ -12229,53 +12260,114 @@
             <p:ph type="title"/>
           </p:nvPr>
         </p:nvSpPr>
-        <p:spPr/>
+        <p:spPr>
+          <a:xfrm>
+            <a:off x="21495" y="11266"/>
+            <a:ext cx="8915400" cy="465406"/>
+          </a:xfrm>
+        </p:spPr>
         <p:txBody>
           <a:bodyPr/>
           <a:lstStyle/>
           <a:p>
-            <a:endParaRPr lang="en-US"/>
+            <a:pPr algn="l"/>
+            <a:r>
+              <a:rPr lang="en-US" altLang="en-US" sz="2800" dirty="0">
+                <a:solidFill>
+                  <a:schemeClr val="bg1"/>
+                </a:solidFill>
+                <a:cs typeface="Times New Roman" panose="02020603050405020304" pitchFamily="18" charset="0"/>
+              </a:rPr>
+              <a:t>SQL Server 2016 &amp; Reporting Services</a:t>
+            </a:r>
+            <a:endParaRPr lang="en-US" sz="2800" dirty="0"/>
           </a:p>
         </p:txBody>
       </p:sp>
-      <p:sp>
-        <p:nvSpPr>
-          <p:cNvPr id="3" name="Content Placeholder 2"/>
-          <p:cNvSpPr>
-            <a:spLocks noGrp="1"/>
-          </p:cNvSpPr>
+      <p:pic>
+        <p:nvPicPr>
+          <p:cNvPr id="12" name="Content Placeholder 11"/>
+          <p:cNvPicPr>
+            <a:picLocks noGrp="1" noChangeAspect="1"/>
+          </p:cNvPicPr>
           <p:nvPr>
             <p:ph sz="half" idx="1"/>
           </p:nvPr>
-        </p:nvSpPr>
-        <p:spPr/>
-        <p:txBody>
-          <a:bodyPr/>
-          <a:lstStyle/>
-          <a:p>
-            <a:endParaRPr lang="en-US"/>
-          </a:p>
-        </p:txBody>
-      </p:sp>
-      <p:sp>
-        <p:nvSpPr>
-          <p:cNvPr id="4" name="Content Placeholder 3"/>
-          <p:cNvSpPr>
-            <a:spLocks noGrp="1"/>
-          </p:cNvSpPr>
+        </p:nvPicPr>
+        <p:blipFill>
+          <a:blip r:embed="rId2">
+            <a:extLst>
+              <a:ext uri="{28A0092B-C50C-407E-A947-70E740481C1C}">
+                <a14:useLocalDpi xmlns:a14="http://schemas.microsoft.com/office/drawing/2010/main" val="0"/>
+              </a:ext>
+            </a:extLst>
+          </a:blip>
+          <a:stretch>
+            <a:fillRect/>
+          </a:stretch>
+        </p:blipFill>
+        <p:spPr>
+          <a:xfrm>
+            <a:off x="416496" y="1556792"/>
+            <a:ext cx="4248472" cy="4057123"/>
+          </a:xfrm>
+          <a:prstGeom prst="rect">
+            <a:avLst/>
+          </a:prstGeom>
+          <a:ln>
+            <a:noFill/>
+          </a:ln>
+          <a:effectLst>
+            <a:outerShdw blurRad="292100" dist="139700" dir="2700000" algn="tl" rotWithShape="0">
+              <a:srgbClr val="333333">
+                <a:alpha val="65000"/>
+              </a:srgbClr>
+            </a:outerShdw>
+          </a:effectLst>
+        </p:spPr>
+      </p:pic>
+      <p:pic>
+        <p:nvPicPr>
+          <p:cNvPr id="14" name="Content Placeholder 13"/>
+          <p:cNvPicPr>
+            <a:picLocks noGrp="1" noChangeAspect="1"/>
+          </p:cNvPicPr>
           <p:nvPr>
             <p:ph sz="half" idx="2"/>
           </p:nvPr>
-        </p:nvSpPr>
-        <p:spPr/>
-        <p:txBody>
-          <a:bodyPr/>
-          <a:lstStyle/>
-          <a:p>
-            <a:endParaRPr lang="en-US"/>
-          </a:p>
-        </p:txBody>
-      </p:sp>
+        </p:nvPicPr>
+        <p:blipFill>
+          <a:blip r:embed="rId3">
+            <a:extLst>
+              <a:ext uri="{28A0092B-C50C-407E-A947-70E740481C1C}">
+                <a14:useLocalDpi xmlns:a14="http://schemas.microsoft.com/office/drawing/2010/main" val="0"/>
+              </a:ext>
+            </a:extLst>
+          </a:blip>
+          <a:stretch>
+            <a:fillRect/>
+          </a:stretch>
+        </p:blipFill>
+        <p:spPr>
+          <a:xfrm>
+            <a:off x="5241032" y="1556792"/>
+            <a:ext cx="4165476" cy="4057123"/>
+          </a:xfrm>
+          <a:prstGeom prst="rect">
+            <a:avLst/>
+          </a:prstGeom>
+          <a:ln>
+            <a:noFill/>
+          </a:ln>
+          <a:effectLst>
+            <a:outerShdw blurRad="292100" dist="139700" dir="2700000" algn="tl" rotWithShape="0">
+              <a:srgbClr val="333333">
+                <a:alpha val="65000"/>
+              </a:srgbClr>
+            </a:outerShdw>
+          </a:effectLst>
+        </p:spPr>
+      </p:pic>
       <p:sp>
         <p:nvSpPr>
           <p:cNvPr id="5" name="Slide Number Placeholder 4"/>
@@ -12929,7 +13021,7 @@
             </a:pPr>
             <a:r>
               <a:rPr lang="en-US" sz="1800" b="1" dirty="0"/>
-              <a:t>The accounts are divided in 5 roles with different degrees of access.</a:t>
+              <a:t>It is an E-Commerce site, which sells smartphones.</a:t>
             </a:r>
           </a:p>
           <a:p>
@@ -13205,6 +13297,125 @@
 </file>
 
 <file path=ppt/slides/slide20.xml><?xml version="1.0" encoding="utf-8"?>
+<p:sld xmlns:a="http://schemas.openxmlformats.org/drawingml/2006/main" xmlns:r="http://schemas.openxmlformats.org/officeDocument/2006/relationships" xmlns:p="http://schemas.openxmlformats.org/presentationml/2006/main">
+  <p:cSld>
+    <p:spTree>
+      <p:nvGrpSpPr>
+        <p:cNvPr id="1" name=""/>
+        <p:cNvGrpSpPr/>
+        <p:nvPr/>
+      </p:nvGrpSpPr>
+      <p:grpSpPr>
+        <a:xfrm>
+          <a:off x="0" y="0"/>
+          <a:ext cx="0" cy="0"/>
+          <a:chOff x="0" y="0"/>
+          <a:chExt cx="0" cy="0"/>
+        </a:xfrm>
+      </p:grpSpPr>
+      <p:sp>
+        <p:nvSpPr>
+          <p:cNvPr id="2" name="Title 1"/>
+          <p:cNvSpPr>
+            <a:spLocks noGrp="1"/>
+          </p:cNvSpPr>
+          <p:nvPr>
+            <p:ph type="title"/>
+          </p:nvPr>
+        </p:nvSpPr>
+        <p:spPr>
+          <a:xfrm>
+            <a:off x="0" y="0"/>
+            <a:ext cx="8915400" cy="548680"/>
+          </a:xfrm>
+        </p:spPr>
+        <p:txBody>
+          <a:bodyPr/>
+          <a:lstStyle/>
+          <a:p>
+            <a:pPr algn="l"/>
+            <a:r>
+              <a:rPr lang="en-US" altLang="en-US" sz="2800" dirty="0">
+                <a:solidFill>
+                  <a:schemeClr val="bg1"/>
+                </a:solidFill>
+                <a:cs typeface="Times New Roman" panose="02020603050405020304" pitchFamily="18" charset="0"/>
+              </a:rPr>
+              <a:t>Log4Net</a:t>
+            </a:r>
+            <a:endParaRPr lang="en-US" sz="2800" dirty="0"/>
+          </a:p>
+        </p:txBody>
+      </p:sp>
+      <p:pic>
+        <p:nvPicPr>
+          <p:cNvPr id="6" name="Content Placeholder 5"/>
+          <p:cNvPicPr>
+            <a:picLocks noGrp="1" noChangeAspect="1"/>
+          </p:cNvPicPr>
+          <p:nvPr>
+            <p:ph sz="half" idx="1"/>
+          </p:nvPr>
+        </p:nvPicPr>
+        <p:blipFill>
+          <a:blip r:embed="rId2"/>
+          <a:stretch>
+            <a:fillRect/>
+          </a:stretch>
+        </p:blipFill>
+        <p:spPr>
+          <a:xfrm>
+            <a:off x="646634" y="836712"/>
+            <a:ext cx="8268766" cy="5328592"/>
+          </a:xfrm>
+          <a:prstGeom prst="rect">
+            <a:avLst/>
+          </a:prstGeom>
+        </p:spPr>
+      </p:pic>
+      <p:sp>
+        <p:nvSpPr>
+          <p:cNvPr id="5" name="Slide Number Placeholder 4"/>
+          <p:cNvSpPr>
+            <a:spLocks noGrp="1"/>
+          </p:cNvSpPr>
+          <p:nvPr>
+            <p:ph type="sldNum" sz="quarter" idx="12"/>
+          </p:nvPr>
+        </p:nvSpPr>
+        <p:spPr/>
+        <p:txBody>
+          <a:bodyPr/>
+          <a:lstStyle/>
+          <a:p>
+            <a:pPr>
+              <a:defRPr/>
+            </a:pPr>
+            <a:fld id="{E6574C62-3BE2-490C-BC0C-04F56C0A3483}" type="slidenum">
+              <a:rPr lang="en-GB" altLang="en-US" smtClean="0"/>
+              <a:pPr>
+                <a:defRPr/>
+              </a:pPr>
+              <a:t>20</a:t>
+            </a:fld>
+            <a:endParaRPr lang="en-GB" altLang="en-US" dirty="0"/>
+          </a:p>
+        </p:txBody>
+      </p:sp>
+    </p:spTree>
+    <p:extLst>
+      <p:ext uri="{BB962C8B-B14F-4D97-AF65-F5344CB8AC3E}">
+        <p14:creationId xmlns:p14="http://schemas.microsoft.com/office/powerpoint/2010/main" val="2315924780"/>
+      </p:ext>
+    </p:extLst>
+  </p:cSld>
+  <p:clrMapOvr>
+    <a:masterClrMapping/>
+  </p:clrMapOvr>
+</p:sld>
+</file>
+
+<file path=ppt/slides/slide21.xml><?xml version="1.0" encoding="utf-8"?>
 <p:sld xmlns:a="http://schemas.openxmlformats.org/drawingml/2006/main" xmlns:r="http://schemas.openxmlformats.org/officeDocument/2006/relationships" xmlns:p="http://schemas.openxmlformats.org/presentationml/2006/main">
   <p:cSld>
     <p:spTree>
@@ -13413,7 +13624,7 @@
               <a:pPr>
                 <a:defRPr/>
               </a:pPr>
-              <a:t>20</a:t>
+              <a:t>21</a:t>
             </a:fld>
             <a:endParaRPr lang="en-GB" altLang="en-US" dirty="0"/>
           </a:p>
@@ -13432,7 +13643,7 @@
 </p:sld>
 </file>
 
-<file path=ppt/slides/slide21.xml><?xml version="1.0" encoding="utf-8"?>
+<file path=ppt/slides/slide22.xml><?xml version="1.0" encoding="utf-8"?>
 <p:sld xmlns:a="http://schemas.openxmlformats.org/drawingml/2006/main" xmlns:r="http://schemas.openxmlformats.org/officeDocument/2006/relationships" xmlns:p="http://schemas.openxmlformats.org/presentationml/2006/main">
   <p:cSld>
     <p:spTree>
@@ -13594,9 +13805,38 @@
               <a:pPr>
                 <a:defRPr/>
               </a:pPr>
-              <a:t>21</a:t>
+              <a:t>22</a:t>
             </a:fld>
             <a:endParaRPr lang="en-GB" altLang="en-US" dirty="0"/>
+          </a:p>
+        </p:txBody>
+      </p:sp>
+      <p:sp>
+        <p:nvSpPr>
+          <p:cNvPr id="3" name="TextBox 2"/>
+          <p:cNvSpPr txBox="1"/>
+          <p:nvPr/>
+        </p:nvSpPr>
+        <p:spPr>
+          <a:xfrm>
+            <a:off x="704528" y="980728"/>
+            <a:ext cx="7416824" cy="307777"/>
+          </a:xfrm>
+          <a:prstGeom prst="rect">
+            <a:avLst/>
+          </a:prstGeom>
+          <a:noFill/>
+        </p:spPr>
+        <p:txBody>
+          <a:bodyPr wrap="square" rtlCol="0">
+            <a:spAutoFit/>
+          </a:bodyPr>
+          <a:lstStyle/>
+          <a:p>
+            <a:r>
+              <a:rPr lang="en-US" dirty="0"/>
+              <a:t>This package is used to convert a JSON object into a C# class.</a:t>
+            </a:r>
           </a:p>
         </p:txBody>
       </p:sp>
@@ -13613,7 +13853,191 @@
 </p:sld>
 </file>
 
-<file path=ppt/slides/slide22.xml><?xml version="1.0" encoding="utf-8"?>
+<file path=ppt/slides/slide23.xml><?xml version="1.0" encoding="utf-8"?>
+<p:sld xmlns:a="http://schemas.openxmlformats.org/drawingml/2006/main" xmlns:r="http://schemas.openxmlformats.org/officeDocument/2006/relationships" xmlns:p="http://schemas.openxmlformats.org/presentationml/2006/main">
+  <p:cSld>
+    <p:spTree>
+      <p:nvGrpSpPr>
+        <p:cNvPr id="1" name=""/>
+        <p:cNvGrpSpPr/>
+        <p:nvPr/>
+      </p:nvGrpSpPr>
+      <p:grpSpPr>
+        <a:xfrm>
+          <a:off x="0" y="0"/>
+          <a:ext cx="0" cy="0"/>
+          <a:chOff x="0" y="0"/>
+          <a:chExt cx="0" cy="0"/>
+        </a:xfrm>
+      </p:grpSpPr>
+      <p:sp>
+        <p:nvSpPr>
+          <p:cNvPr id="2" name="Title 1"/>
+          <p:cNvSpPr>
+            <a:spLocks noGrp="1"/>
+          </p:cNvSpPr>
+          <p:nvPr>
+            <p:ph type="title"/>
+          </p:nvPr>
+        </p:nvSpPr>
+        <p:spPr>
+          <a:xfrm>
+            <a:off x="0" y="0"/>
+            <a:ext cx="8915400" cy="548680"/>
+          </a:xfrm>
+        </p:spPr>
+        <p:txBody>
+          <a:bodyPr/>
+          <a:lstStyle/>
+          <a:p>
+            <a:pPr algn="l"/>
+            <a:r>
+              <a:rPr lang="en-US" sz="2800" dirty="0">
+                <a:solidFill>
+                  <a:schemeClr val="bg1"/>
+                </a:solidFill>
+              </a:rPr>
+              <a:t>Unit Testing</a:t>
+            </a:r>
+          </a:p>
+        </p:txBody>
+      </p:sp>
+      <p:pic>
+        <p:nvPicPr>
+          <p:cNvPr id="7" name="Content Placeholder 6"/>
+          <p:cNvPicPr>
+            <a:picLocks noGrp="1" noChangeAspect="1"/>
+          </p:cNvPicPr>
+          <p:nvPr>
+            <p:ph sz="half" idx="1"/>
+          </p:nvPr>
+        </p:nvPicPr>
+        <p:blipFill>
+          <a:blip r:embed="rId2">
+            <a:extLst>
+              <a:ext uri="{28A0092B-C50C-407E-A947-70E740481C1C}">
+                <a14:useLocalDpi xmlns:a14="http://schemas.microsoft.com/office/drawing/2010/main" val="0"/>
+              </a:ext>
+            </a:extLst>
+          </a:blip>
+          <a:stretch>
+            <a:fillRect/>
+          </a:stretch>
+        </p:blipFill>
+        <p:spPr>
+          <a:xfrm>
+            <a:off x="788112" y="2616843"/>
+            <a:ext cx="7958748" cy="3769676"/>
+          </a:xfrm>
+          <a:prstGeom prst="rect">
+            <a:avLst/>
+          </a:prstGeom>
+          <a:ln>
+            <a:noFill/>
+          </a:ln>
+          <a:effectLst>
+            <a:outerShdw blurRad="292100" dist="139700" dir="2700000" algn="tl" rotWithShape="0">
+              <a:srgbClr val="333333">
+                <a:alpha val="65000"/>
+              </a:srgbClr>
+            </a:outerShdw>
+          </a:effectLst>
+        </p:spPr>
+      </p:pic>
+      <p:sp>
+        <p:nvSpPr>
+          <p:cNvPr id="4" name="Content Placeholder 3"/>
+          <p:cNvSpPr>
+            <a:spLocks noGrp="1"/>
+          </p:cNvSpPr>
+          <p:nvPr>
+            <p:ph sz="half" idx="2"/>
+          </p:nvPr>
+        </p:nvSpPr>
+        <p:spPr>
+          <a:xfrm>
+            <a:off x="788112" y="1196752"/>
+            <a:ext cx="8127288" cy="792088"/>
+          </a:xfrm>
+        </p:spPr>
+        <p:txBody>
+          <a:bodyPr/>
+          <a:lstStyle/>
+          <a:p>
+            <a:pPr marL="0" indent="0">
+              <a:buNone/>
+            </a:pPr>
+            <a:r>
+              <a:rPr lang="en-US" sz="1400" dirty="0">
+                <a:latin typeface="Times New Roman" panose="02020603050405020304" pitchFamily="18" charset="0"/>
+                <a:cs typeface="Times New Roman" panose="02020603050405020304" pitchFamily="18" charset="0"/>
+              </a:rPr>
+              <a:t>        In computer programming, </a:t>
+            </a:r>
+            <a:r>
+              <a:rPr lang="en-US" sz="1400" b="1" dirty="0">
+                <a:latin typeface="Times New Roman" panose="02020603050405020304" pitchFamily="18" charset="0"/>
+                <a:cs typeface="Times New Roman" panose="02020603050405020304" pitchFamily="18" charset="0"/>
+              </a:rPr>
+              <a:t>unit testing</a:t>
+            </a:r>
+            <a:r>
+              <a:rPr lang="en-US" sz="1400" dirty="0">
+                <a:latin typeface="Times New Roman" panose="02020603050405020304" pitchFamily="18" charset="0"/>
+                <a:cs typeface="Times New Roman" panose="02020603050405020304" pitchFamily="18" charset="0"/>
+              </a:rPr>
+              <a:t> is a software testing method by which individual units of source code, sets of one or more computer program modules together with associated control data, usage procedures, and operating procedures, are tested to determine whether they are fit for use.</a:t>
+            </a:r>
+            <a:endParaRPr lang="en-US" sz="1400" dirty="0">
+              <a:latin typeface="Times New Roman" panose="02020603050405020304" pitchFamily="18" charset="0"/>
+              <a:cs typeface="Times New Roman" panose="02020603050405020304" pitchFamily="18" charset="0"/>
+            </a:endParaRPr>
+          </a:p>
+        </p:txBody>
+      </p:sp>
+      <p:sp>
+        <p:nvSpPr>
+          <p:cNvPr id="5" name="Slide Number Placeholder 4"/>
+          <p:cNvSpPr>
+            <a:spLocks noGrp="1"/>
+          </p:cNvSpPr>
+          <p:nvPr>
+            <p:ph type="sldNum" sz="quarter" idx="12"/>
+          </p:nvPr>
+        </p:nvSpPr>
+        <p:spPr/>
+        <p:txBody>
+          <a:bodyPr/>
+          <a:lstStyle/>
+          <a:p>
+            <a:pPr>
+              <a:defRPr/>
+            </a:pPr>
+            <a:fld id="{E6574C62-3BE2-490C-BC0C-04F56C0A3483}" type="slidenum">
+              <a:rPr lang="en-GB" altLang="en-US" smtClean="0"/>
+              <a:pPr>
+                <a:defRPr/>
+              </a:pPr>
+              <a:t>23</a:t>
+            </a:fld>
+            <a:endParaRPr lang="en-GB" altLang="en-US" dirty="0"/>
+          </a:p>
+        </p:txBody>
+      </p:sp>
+    </p:spTree>
+    <p:extLst>
+      <p:ext uri="{BB962C8B-B14F-4D97-AF65-F5344CB8AC3E}">
+        <p14:creationId xmlns:p14="http://schemas.microsoft.com/office/powerpoint/2010/main" val="446910722"/>
+      </p:ext>
+    </p:extLst>
+  </p:cSld>
+  <p:clrMapOvr>
+    <a:masterClrMapping/>
+  </p:clrMapOvr>
+</p:sld>
+</file>
+
+<file path=ppt/slides/slide24.xml><?xml version="1.0" encoding="utf-8"?>
 <p:sld xmlns:a="http://schemas.openxmlformats.org/drawingml/2006/main" xmlns:r="http://schemas.openxmlformats.org/officeDocument/2006/relationships" xmlns:p="http://schemas.openxmlformats.org/presentationml/2006/main">
   <p:cSld>
     <p:spTree>
@@ -13810,7 +14234,7 @@
                 <a:buFontTx/>
                 <a:buNone/>
               </a:pPr>
-              <a:t>22</a:t>
+              <a:t>24</a:t>
             </a:fld>
             <a:endParaRPr lang="en-GB" altLang="en-US" sz="1400" dirty="0"/>
           </a:p>

</xml_diff>

<commit_message>
modificat prezentare powerpoint, partea de server
</commit_message>
<xml_diff>
--- a/Documents/Application.Architecture.pptx
+++ b/Documents/Application.Architecture.pptx
@@ -9189,7 +9189,6 @@
               <a:rPr lang="en-US" dirty="0"/>
               <a:t>Desktop view</a:t>
             </a:r>
-            <a:endParaRPr lang="en-US" dirty="0"/>
           </a:p>
         </p:txBody>
       </p:sp>
@@ -11418,8 +11417,8 @@
         </p:blipFill>
         <p:spPr>
           <a:xfrm>
-            <a:off x="6002529" y="1340768"/>
-            <a:ext cx="2896243" cy="4536033"/>
+            <a:off x="5745088" y="1268760"/>
+            <a:ext cx="3312368" cy="4752528"/>
           </a:xfrm>
           <a:prstGeom prst="rect">
             <a:avLst/>
@@ -11739,9 +11738,22 @@
         </p:blipFill>
         <p:spPr>
           <a:xfrm>
-            <a:off x="5567996" y="781465"/>
-            <a:ext cx="3838511" cy="2359504"/>
+            <a:off x="5952812" y="836712"/>
+            <a:ext cx="2925993" cy="2359504"/>
           </a:xfrm>
+          <a:prstGeom prst="rect">
+            <a:avLst/>
+          </a:prstGeom>
+          <a:ln>
+            <a:noFill/>
+          </a:ln>
+          <a:effectLst>
+            <a:outerShdw blurRad="190500" algn="tl" rotWithShape="0">
+              <a:srgbClr val="000000">
+                <a:alpha val="70000"/>
+              </a:srgbClr>
+            </a:outerShdw>
+          </a:effectLst>
         </p:spPr>
       </p:pic>
       <p:pic>
@@ -11766,12 +11778,22 @@
         </p:blipFill>
         <p:spPr>
           <a:xfrm>
-            <a:off x="5587887" y="3808511"/>
-            <a:ext cx="3783265" cy="2450407"/>
+            <a:off x="5889104" y="3861048"/>
+            <a:ext cx="3053411" cy="2314217"/>
           </a:xfrm>
           <a:prstGeom prst="rect">
             <a:avLst/>
           </a:prstGeom>
+          <a:ln>
+            <a:noFill/>
+          </a:ln>
+          <a:effectLst>
+            <a:outerShdw blurRad="190500" algn="tl" rotWithShape="0">
+              <a:srgbClr val="000000">
+                <a:alpha val="70000"/>
+              </a:srgbClr>
+            </a:outerShdw>
+          </a:effectLst>
         </p:spPr>
       </p:pic>
       <p:pic>
@@ -11796,12 +11818,22 @@
         </p:blipFill>
         <p:spPr>
           <a:xfrm>
-            <a:off x="344488" y="5097420"/>
-            <a:ext cx="4896544" cy="1190625"/>
+            <a:off x="488504" y="4941168"/>
+            <a:ext cx="4608512" cy="1234096"/>
           </a:xfrm>
           <a:prstGeom prst="rect">
             <a:avLst/>
           </a:prstGeom>
+          <a:ln>
+            <a:noFill/>
+          </a:ln>
+          <a:effectLst>
+            <a:outerShdw blurRad="190500" algn="tl" rotWithShape="0">
+              <a:srgbClr val="000000">
+                <a:alpha val="70000"/>
+              </a:srgbClr>
+            </a:outerShdw>
+          </a:effectLst>
         </p:spPr>
       </p:pic>
     </p:spTree>

</xml_diff>

<commit_message>
prezentare powerpoint. aranjare poze
</commit_message>
<xml_diff>
--- a/Documents/Application.Architecture.pptx
+++ b/Documents/Application.Architecture.pptx
@@ -9137,9 +9137,9 @@
             <a:noFill/>
           </a:ln>
           <a:effectLst>
-            <a:outerShdw blurRad="292100" dist="139700" dir="2700000" algn="tl" rotWithShape="0">
-              <a:srgbClr val="333333">
-                <a:alpha val="65000"/>
+            <a:outerShdw blurRad="190500" algn="tl" rotWithShape="0">
+              <a:srgbClr val="000000">
+                <a:alpha val="70000"/>
               </a:srgbClr>
             </a:outerShdw>
           </a:effectLst>
@@ -9508,9 +9508,9 @@
             <a:noFill/>
           </a:ln>
           <a:effectLst>
-            <a:outerShdw blurRad="292100" dist="139700" dir="2700000" algn="tl" rotWithShape="0">
-              <a:srgbClr val="333333">
-                <a:alpha val="65000"/>
+            <a:outerShdw blurRad="190500" algn="tl" rotWithShape="0">
+              <a:srgbClr val="000000">
+                <a:alpha val="70000"/>
               </a:srgbClr>
             </a:outerShdw>
           </a:effectLst>
@@ -9774,9 +9774,9 @@
             <a:noFill/>
           </a:ln>
           <a:effectLst>
-            <a:outerShdw blurRad="292100" dist="139700" dir="2700000" algn="tl" rotWithShape="0">
-              <a:srgbClr val="333333">
-                <a:alpha val="65000"/>
+            <a:outerShdw blurRad="190500" algn="tl" rotWithShape="0">
+              <a:srgbClr val="000000">
+                <a:alpha val="70000"/>
               </a:srgbClr>
             </a:outerShdw>
           </a:effectLst>
@@ -9833,8 +9833,8 @@
         </p:blipFill>
         <p:spPr>
           <a:xfrm>
-            <a:off x="1068140" y="3229082"/>
-            <a:ext cx="7605960" cy="3362218"/>
+            <a:off x="1067024" y="3166054"/>
+            <a:ext cx="7605960" cy="3171718"/>
           </a:xfrm>
           <a:prstGeom prst="rect">
             <a:avLst/>
@@ -9843,9 +9843,9 @@
             <a:noFill/>
           </a:ln>
           <a:effectLst>
-            <a:outerShdw blurRad="292100" dist="139700" dir="2700000" algn="tl" rotWithShape="0">
-              <a:srgbClr val="333333">
-                <a:alpha val="65000"/>
+            <a:outerShdw blurRad="190500" algn="tl" rotWithShape="0">
+              <a:srgbClr val="000000">
+                <a:alpha val="70000"/>
               </a:srgbClr>
             </a:outerShdw>
           </a:effectLst>
@@ -11275,7 +11275,7 @@
         </p:nvSpPr>
         <p:spPr>
           <a:xfrm>
-            <a:off x="13963" y="0"/>
+            <a:off x="0" y="0"/>
             <a:ext cx="8915400" cy="548680"/>
           </a:xfrm>
         </p:spPr>
@@ -11427,9 +11427,9 @@
             <a:noFill/>
           </a:ln>
           <a:effectLst>
-            <a:outerShdw blurRad="292100" dist="139700" dir="2700000" algn="tl" rotWithShape="0">
-              <a:srgbClr val="333333">
-                <a:alpha val="65000"/>
+            <a:outerShdw blurRad="190500" algn="tl" rotWithShape="0">
+              <a:srgbClr val="000000">
+                <a:alpha val="70000"/>
               </a:srgbClr>
             </a:outerShdw>
           </a:effectLst>
@@ -11666,21 +11666,7 @@
                 <a:latin typeface="Times New Roman" panose="02020603050405020304" pitchFamily="18" charset="0"/>
                 <a:cs typeface="Times New Roman" panose="02020603050405020304" pitchFamily="18" charset="0"/>
               </a:rPr>
-              <a:t>) is a Microsoft.NET Framework component that adds native data querying capabilities to .NET languages, although ports exist for PHP, JavaScript, </a:t>
-            </a:r>
-            <a:r>
-              <a:rPr lang="en-US" sz="1400" dirty="0" err="1">
-                <a:latin typeface="Times New Roman" panose="02020603050405020304" pitchFamily="18" charset="0"/>
-                <a:cs typeface="Times New Roman" panose="02020603050405020304" pitchFamily="18" charset="0"/>
-              </a:rPr>
-              <a:t>TypeScript</a:t>
-            </a:r>
-            <a:r>
-              <a:rPr lang="en-US" sz="1400" dirty="0">
-                <a:latin typeface="Times New Roman" panose="02020603050405020304" pitchFamily="18" charset="0"/>
-                <a:cs typeface="Times New Roman" panose="02020603050405020304" pitchFamily="18" charset="0"/>
-              </a:rPr>
-              <a:t> and ActionScript.</a:t>
+              <a:t>) is a Microsoft.NET Framework component that adds native data querying capabilities to .NET languages.</a:t>
             </a:r>
           </a:p>
         </p:txBody>
@@ -11738,8 +11724,8 @@
         </p:blipFill>
         <p:spPr>
           <a:xfrm>
-            <a:off x="5952812" y="836712"/>
-            <a:ext cx="2925993" cy="2359504"/>
+            <a:off x="5529064" y="692696"/>
+            <a:ext cx="3912085" cy="2820016"/>
           </a:xfrm>
           <a:prstGeom prst="rect">
             <a:avLst/>
@@ -11778,8 +11764,8 @@
         </p:blipFill>
         <p:spPr>
           <a:xfrm>
-            <a:off x="5889104" y="3861048"/>
-            <a:ext cx="3053411" cy="2314217"/>
+            <a:off x="5529064" y="3753265"/>
+            <a:ext cx="3912085" cy="2647536"/>
           </a:xfrm>
           <a:prstGeom prst="rect">
             <a:avLst/>
@@ -11818,7 +11804,7 @@
         </p:blipFill>
         <p:spPr>
           <a:xfrm>
-            <a:off x="488504" y="4941168"/>
+            <a:off x="476819" y="5166704"/>
             <a:ext cx="4608512" cy="1234096"/>
           </a:xfrm>
           <a:prstGeom prst="rect">
@@ -12128,8 +12114,8 @@
         </p:blipFill>
         <p:spPr>
           <a:xfrm>
-            <a:off x="5970228" y="836712"/>
-            <a:ext cx="3096344" cy="5218083"/>
+            <a:off x="5745088" y="836146"/>
+            <a:ext cx="3393492" cy="5218083"/>
           </a:xfrm>
           <a:prstGeom prst="rect">
             <a:avLst/>
@@ -12138,9 +12124,9 @@
             <a:noFill/>
           </a:ln>
           <a:effectLst>
-            <a:outerShdw blurRad="292100" dist="139700" dir="2700000" algn="tl" rotWithShape="0">
-              <a:srgbClr val="333333">
-                <a:alpha val="65000"/>
+            <a:outerShdw blurRad="190500" algn="tl" rotWithShape="0">
+              <a:srgbClr val="000000">
+                <a:alpha val="70000"/>
               </a:srgbClr>
             </a:outerShdw>
           </a:effectLst>
@@ -12384,9 +12370,9 @@
             <a:noFill/>
           </a:ln>
           <a:effectLst>
-            <a:outerShdw blurRad="292100" dist="139700" dir="2700000" algn="tl" rotWithShape="0">
-              <a:srgbClr val="333333">
-                <a:alpha val="65000"/>
+            <a:outerShdw blurRad="190500" algn="tl" rotWithShape="0">
+              <a:srgbClr val="000000">
+                <a:alpha val="70000"/>
               </a:srgbClr>
             </a:outerShdw>
           </a:effectLst>
@@ -12453,9 +12439,9 @@
             <a:noFill/>
           </a:ln>
           <a:effectLst>
-            <a:outerShdw blurRad="292100" dist="139700" dir="2700000" algn="tl" rotWithShape="0">
-              <a:srgbClr val="333333">
-                <a:alpha val="65000"/>
+            <a:outerShdw blurRad="190500" algn="tl" rotWithShape="0">
+              <a:srgbClr val="000000">
+                <a:alpha val="70000"/>
               </a:srgbClr>
             </a:outerShdw>
           </a:effectLst>
@@ -12611,8 +12597,8 @@
         </p:blipFill>
         <p:spPr>
           <a:xfrm>
-            <a:off x="450283" y="3356992"/>
-            <a:ext cx="4327229" cy="2880320"/>
+            <a:off x="450283" y="3068960"/>
+            <a:ext cx="4327229" cy="3168352"/>
           </a:xfrm>
           <a:prstGeom prst="rect">
             <a:avLst/>
@@ -12621,9 +12607,9 @@
             <a:noFill/>
           </a:ln>
           <a:effectLst>
-            <a:outerShdw blurRad="292100" dist="139700" dir="2700000" algn="tl" rotWithShape="0">
-              <a:srgbClr val="333333">
-                <a:alpha val="65000"/>
+            <a:outerShdw blurRad="190500" algn="tl" rotWithShape="0">
+              <a:srgbClr val="000000">
+                <a:alpha val="70000"/>
               </a:srgbClr>
             </a:outerShdw>
           </a:effectLst>
@@ -12680,8 +12666,8 @@
         </p:blipFill>
         <p:spPr>
           <a:xfrm>
-            <a:off x="5097016" y="3349724"/>
-            <a:ext cx="4265392" cy="2887588"/>
+            <a:off x="5097016" y="3068960"/>
+            <a:ext cx="4265392" cy="3168352"/>
           </a:xfrm>
           <a:prstGeom prst="rect">
             <a:avLst/>
@@ -12690,9 +12676,9 @@
             <a:noFill/>
           </a:ln>
           <a:effectLst>
-            <a:outerShdw blurRad="292100" dist="139700" dir="2700000" algn="tl" rotWithShape="0">
-              <a:srgbClr val="333333">
-                <a:alpha val="65000"/>
+            <a:outerShdw blurRad="190500" algn="tl" rotWithShape="0">
+              <a:srgbClr val="000000">
+                <a:alpha val="70000"/>
               </a:srgbClr>
             </a:outerShdw>
           </a:effectLst>
@@ -13747,7 +13733,7 @@
         </p:blipFill>
         <p:spPr>
           <a:xfrm>
-            <a:off x="497260" y="1772815"/>
+            <a:off x="513640" y="1988840"/>
             <a:ext cx="3960440" cy="3648075"/>
           </a:xfrm>
           <a:prstGeom prst="rect">
@@ -13757,9 +13743,9 @@
             <a:noFill/>
           </a:ln>
           <a:effectLst>
-            <a:outerShdw blurRad="292100" dist="139700" dir="2700000" algn="tl" rotWithShape="0">
-              <a:srgbClr val="333333">
-                <a:alpha val="65000"/>
+            <a:outerShdw blurRad="190500" algn="tl" rotWithShape="0">
+              <a:srgbClr val="000000">
+                <a:alpha val="70000"/>
               </a:srgbClr>
             </a:outerShdw>
           </a:effectLst>
@@ -13789,7 +13775,7 @@
         </p:blipFill>
         <p:spPr>
           <a:xfrm>
-            <a:off x="5097016" y="1772816"/>
+            <a:off x="5097016" y="1988840"/>
             <a:ext cx="4381500" cy="3648075"/>
           </a:xfrm>
           <a:prstGeom prst="rect">
@@ -13799,9 +13785,9 @@
             <a:noFill/>
           </a:ln>
           <a:effectLst>
-            <a:outerShdw blurRad="292100" dist="139700" dir="2700000" algn="tl" rotWithShape="0">
-              <a:srgbClr val="333333">
-                <a:alpha val="65000"/>
+            <a:outerShdw blurRad="190500" algn="tl" rotWithShape="0">
+              <a:srgbClr val="000000">
+                <a:alpha val="70000"/>
               </a:srgbClr>
             </a:outerShdw>
           </a:effectLst>
@@ -13961,9 +13947,9 @@
             <a:noFill/>
           </a:ln>
           <a:effectLst>
-            <a:outerShdw blurRad="292100" dist="139700" dir="2700000" algn="tl" rotWithShape="0">
-              <a:srgbClr val="333333">
-                <a:alpha val="65000"/>
+            <a:outerShdw blurRad="190500" algn="tl" rotWithShape="0">
+              <a:srgbClr val="000000">
+                <a:alpha val="70000"/>
               </a:srgbClr>
             </a:outerShdw>
           </a:effectLst>
@@ -18226,7 +18212,7 @@
         </p:blipFill>
         <p:spPr>
           <a:xfrm>
-            <a:off x="416496" y="2204864"/>
+            <a:off x="345983" y="2547408"/>
             <a:ext cx="5976664" cy="3568200"/>
           </a:xfrm>
           <a:prstGeom prst="rect">
@@ -18236,9 +18222,9 @@
             <a:noFill/>
           </a:ln>
           <a:effectLst>
-            <a:outerShdw blurRad="292100" dist="139700" dir="2700000" algn="tl" rotWithShape="0">
-              <a:srgbClr val="333333">
-                <a:alpha val="65000"/>
+            <a:outerShdw blurRad="190500" algn="tl" rotWithShape="0">
+              <a:srgbClr val="000000">
+                <a:alpha val="70000"/>
               </a:srgbClr>
             </a:outerShdw>
           </a:effectLst>
@@ -18345,9 +18331,9 @@
             <a:noFill/>
           </a:ln>
           <a:effectLst>
-            <a:outerShdw blurRad="292100" dist="139700" dir="2700000" algn="tl" rotWithShape="0">
-              <a:srgbClr val="333333">
-                <a:alpha val="65000"/>
+            <a:outerShdw blurRad="190500" algn="tl" rotWithShape="0">
+              <a:srgbClr val="000000">
+                <a:alpha val="70000"/>
               </a:srgbClr>
             </a:outerShdw>
           </a:effectLst>
@@ -18439,7 +18425,7 @@
         </p:blipFill>
         <p:spPr>
           <a:xfrm>
-            <a:off x="6591404" y="1772816"/>
+            <a:off x="6519396" y="1807948"/>
             <a:ext cx="2724150" cy="1752600"/>
           </a:xfrm>
           <a:prstGeom prst="rect">
@@ -18449,9 +18435,9 @@
             <a:noFill/>
           </a:ln>
           <a:effectLst>
-            <a:outerShdw blurRad="292100" dist="139700" dir="2700000" algn="tl" rotWithShape="0">
-              <a:srgbClr val="333333">
-                <a:alpha val="65000"/>
+            <a:outerShdw blurRad="190500" algn="tl" rotWithShape="0">
+              <a:srgbClr val="000000">
+                <a:alpha val="70000"/>
               </a:srgbClr>
             </a:outerShdw>
           </a:effectLst>
@@ -18510,8 +18496,8 @@
         </p:blipFill>
         <p:spPr>
           <a:xfrm>
-            <a:off x="344488" y="1772816"/>
-            <a:ext cx="5544616" cy="4212831"/>
+            <a:off x="344488" y="1807948"/>
+            <a:ext cx="5544616" cy="4389293"/>
           </a:xfrm>
           <a:prstGeom prst="rect">
             <a:avLst/>
@@ -18520,9 +18506,9 @@
             <a:noFill/>
           </a:ln>
           <a:effectLst>
-            <a:outerShdw blurRad="292100" dist="139700" dir="2700000" algn="tl" rotWithShape="0">
-              <a:srgbClr val="333333">
-                <a:alpha val="65000"/>
+            <a:outerShdw blurRad="190500" algn="tl" rotWithShape="0">
+              <a:srgbClr val="000000">
+                <a:alpha val="70000"/>
               </a:srgbClr>
             </a:outerShdw>
           </a:effectLst>
@@ -18550,7 +18536,7 @@
         </p:blipFill>
         <p:spPr>
           <a:xfrm>
-            <a:off x="6321152" y="4149080"/>
+            <a:off x="6249144" y="4149080"/>
             <a:ext cx="3264654" cy="2048161"/>
           </a:xfrm>
           <a:prstGeom prst="rect">
@@ -18560,9 +18546,9 @@
             <a:noFill/>
           </a:ln>
           <a:effectLst>
-            <a:outerShdw blurRad="292100" dist="139700" dir="2700000" algn="tl" rotWithShape="0">
-              <a:srgbClr val="333333">
-                <a:alpha val="65000"/>
+            <a:outerShdw blurRad="190500" algn="tl" rotWithShape="0">
+              <a:srgbClr val="000000">
+                <a:alpha val="70000"/>
               </a:srgbClr>
             </a:outerShdw>
           </a:effectLst>
@@ -18707,7 +18693,7 @@
         </p:blipFill>
         <p:spPr>
           <a:xfrm>
-            <a:off x="436593" y="1556792"/>
+            <a:off x="410557" y="1556792"/>
             <a:ext cx="5256584" cy="2277625"/>
           </a:xfrm>
           <a:prstGeom prst="rect">
@@ -18717,9 +18703,9 @@
             <a:noFill/>
           </a:ln>
           <a:effectLst>
-            <a:outerShdw blurRad="292100" dist="139700" dir="2700000" algn="tl" rotWithShape="0">
-              <a:srgbClr val="333333">
-                <a:alpha val="65000"/>
+            <a:outerShdw blurRad="190500" algn="tl" rotWithShape="0">
+              <a:srgbClr val="000000">
+                <a:alpha val="70000"/>
               </a:srgbClr>
             </a:outerShdw>
           </a:effectLst>
@@ -18826,9 +18812,9 @@
             <a:noFill/>
           </a:ln>
           <a:effectLst>
-            <a:outerShdw blurRad="292100" dist="139700" dir="2700000" algn="tl" rotWithShape="0">
-              <a:srgbClr val="333333">
-                <a:alpha val="65000"/>
+            <a:outerShdw blurRad="190500" algn="tl" rotWithShape="0">
+              <a:srgbClr val="000000">
+                <a:alpha val="70000"/>
               </a:srgbClr>
             </a:outerShdw>
           </a:effectLst>
@@ -18856,7 +18842,7 @@
         </p:blipFill>
         <p:spPr>
           <a:xfrm>
-            <a:off x="436593" y="4581128"/>
+            <a:off x="410557" y="4581128"/>
             <a:ext cx="4461100" cy="1393330"/>
           </a:xfrm>
           <a:prstGeom prst="rect">
@@ -18866,9 +18852,9 @@
             <a:noFill/>
           </a:ln>
           <a:effectLst>
-            <a:outerShdw blurRad="292100" dist="139700" dir="2700000" algn="tl" rotWithShape="0">
-              <a:srgbClr val="333333">
-                <a:alpha val="65000"/>
+            <a:outerShdw blurRad="190500" algn="tl" rotWithShape="0">
+              <a:srgbClr val="000000">
+                <a:alpha val="70000"/>
               </a:srgbClr>
             </a:outerShdw>
           </a:effectLst>
@@ -18970,9 +18956,9 @@
             <a:noFill/>
           </a:ln>
           <a:effectLst>
-            <a:outerShdw blurRad="292100" dist="139700" dir="2700000" algn="tl" rotWithShape="0">
-              <a:srgbClr val="333333">
-                <a:alpha val="65000"/>
+            <a:outerShdw blurRad="190500" algn="tl" rotWithShape="0">
+              <a:srgbClr val="000000">
+                <a:alpha val="70000"/>
               </a:srgbClr>
             </a:outerShdw>
           </a:effectLst>
@@ -19041,9 +19027,9 @@
             <a:noFill/>
           </a:ln>
           <a:effectLst>
-            <a:outerShdw blurRad="292100" dist="139700" dir="2700000" algn="tl" rotWithShape="0">
-              <a:srgbClr val="333333">
-                <a:alpha val="65000"/>
+            <a:outerShdw blurRad="190500" algn="tl" rotWithShape="0">
+              <a:srgbClr val="000000">
+                <a:alpha val="70000"/>
               </a:srgbClr>
             </a:outerShdw>
           </a:effectLst>
@@ -19199,9 +19185,9 @@
             <a:noFill/>
           </a:ln>
           <a:effectLst>
-            <a:outerShdw blurRad="292100" dist="139700" dir="2700000" algn="tl" rotWithShape="0">
-              <a:srgbClr val="333333">
-                <a:alpha val="65000"/>
+            <a:outerShdw blurRad="190500" algn="tl" rotWithShape="0">
+              <a:srgbClr val="000000">
+                <a:alpha val="70000"/>
               </a:srgbClr>
             </a:outerShdw>
           </a:effectLst>
@@ -19549,9 +19535,9 @@
             <a:noFill/>
           </a:ln>
           <a:effectLst>
-            <a:outerShdw blurRad="292100" dist="139700" dir="2700000" algn="tl" rotWithShape="0">
-              <a:srgbClr val="333333">
-                <a:alpha val="65000"/>
+            <a:outerShdw blurRad="190500" algn="tl" rotWithShape="0">
+              <a:srgbClr val="000000">
+                <a:alpha val="70000"/>
               </a:srgbClr>
             </a:outerShdw>
           </a:effectLst>

</xml_diff>

<commit_message>
am sters din orderdetails si territories ce nu foloseam
</commit_message>
<xml_diff>
--- a/Documents/Application.Architecture.pptx
+++ b/Documents/Application.Architecture.pptx
@@ -9189,7 +9189,6 @@
               <a:rPr lang="en-US" dirty="0"/>
               <a:t>Desktop view</a:t>
             </a:r>
-            <a:endParaRPr lang="en-US" dirty="0"/>
           </a:p>
         </p:txBody>
       </p:sp>
@@ -18009,10 +18008,16 @@
               <a:defRPr/>
             </a:pPr>
             <a:r>
+              <a:rPr lang="en-US" altLang="en-US" sz="2000">
+                <a:cs typeface="Times New Roman" panose="02020603050405020304" pitchFamily="18" charset="0"/>
+              </a:rPr>
+              <a:t> HTML5 </a:t>
+            </a:r>
+            <a:r>
               <a:rPr lang="en-US" altLang="en-US" sz="2000" dirty="0">
                 <a:cs typeface="Times New Roman" panose="02020603050405020304" pitchFamily="18" charset="0"/>
               </a:rPr>
-              <a:t> HTML 5 &amp; CSS3</a:t>
+              <a:t>&amp; CSS3</a:t>
             </a:r>
           </a:p>
           <a:p>

</xml_diff>

<commit_message>
am sters un text
</commit_message>
<xml_diff>
--- a/Documents/Application.Architecture.pptx
+++ b/Documents/Application.Architecture.pptx
@@ -12369,7 +12369,7 @@
         <p:spPr>
           <a:xfrm>
             <a:off x="5169024" y="1128875"/>
-            <a:ext cx="4270552" cy="5146594"/>
+            <a:ext cx="4270552" cy="5271924"/>
           </a:xfrm>
           <a:prstGeom prst="rect">
             <a:avLst/>
@@ -12402,33 +12402,24 @@
         </p:blipFill>
         <p:spPr>
           <a:xfrm>
-            <a:off x="355444" y="4397834"/>
+            <a:off x="454363" y="4397834"/>
             <a:ext cx="4282581" cy="2002965"/>
           </a:xfrm>
           <a:prstGeom prst="rect">
             <a:avLst/>
           </a:prstGeom>
+          <a:ln>
+            <a:noFill/>
+          </a:ln>
+          <a:effectLst>
+            <a:outerShdw blurRad="190500" algn="tl" rotWithShape="0">
+              <a:srgbClr val="000000">
+                <a:alpha val="70000"/>
+              </a:srgbClr>
+            </a:outerShdw>
+          </a:effectLst>
         </p:spPr>
       </p:pic>
-      <p:sp>
-        <p:nvSpPr>
-          <p:cNvPr id="8" name="Content Placeholder 7"/>
-          <p:cNvSpPr>
-            <a:spLocks noGrp="1"/>
-          </p:cNvSpPr>
-          <p:nvPr>
-            <p:ph sz="half" idx="2"/>
-          </p:nvPr>
-        </p:nvSpPr>
-        <p:spPr/>
-        <p:txBody>
-          <a:bodyPr/>
-          <a:lstStyle/>
-          <a:p>
-            <a:endParaRPr lang="en-US"/>
-          </a:p>
-        </p:txBody>
-      </p:sp>
     </p:spTree>
     <p:extLst>
       <p:ext uri="{BB962C8B-B14F-4D97-AF65-F5344CB8AC3E}">

</xml_diff>